<commit_message>
Arquitetura (HLD,LLD) e documentação atualizada (irrigação)
</commit_message>
<xml_diff>
--- a/documentacao/P&I/Sprint 1 - Todos os entregáveis/Apresentação Contexto Negócio-Justificativa Projeto.pptx
+++ b/documentacao/P&I/Sprint 1 - Todos os entregáveis/Apresentação Contexto Negócio-Justificativa Projeto.pptx
@@ -264,7 +264,7 @@
           <a:p>
             <a:fld id="{366C7219-F141-4E29-8D5C-5E288BED1C06}" type="datetimeFigureOut">
               <a:rPr lang="pt-BR" smtClean="0"/>
-              <a:t>16/03/2019</a:t>
+              <a:t>17/04/2019</a:t>
             </a:fld>
             <a:endParaRPr lang="pt-BR"/>
           </a:p>
@@ -462,7 +462,7 @@
           <a:p>
             <a:fld id="{366C7219-F141-4E29-8D5C-5E288BED1C06}" type="datetimeFigureOut">
               <a:rPr lang="pt-BR" smtClean="0"/>
-              <a:t>16/03/2019</a:t>
+              <a:t>17/04/2019</a:t>
             </a:fld>
             <a:endParaRPr lang="pt-BR"/>
           </a:p>
@@ -670,7 +670,7 @@
           <a:p>
             <a:fld id="{366C7219-F141-4E29-8D5C-5E288BED1C06}" type="datetimeFigureOut">
               <a:rPr lang="pt-BR" smtClean="0"/>
-              <a:t>16/03/2019</a:t>
+              <a:t>17/04/2019</a:t>
             </a:fld>
             <a:endParaRPr lang="pt-BR"/>
           </a:p>
@@ -868,7 +868,7 @@
           <a:p>
             <a:fld id="{366C7219-F141-4E29-8D5C-5E288BED1C06}" type="datetimeFigureOut">
               <a:rPr lang="pt-BR" smtClean="0"/>
-              <a:t>16/03/2019</a:t>
+              <a:t>17/04/2019</a:t>
             </a:fld>
             <a:endParaRPr lang="pt-BR"/>
           </a:p>
@@ -1143,7 +1143,7 @@
           <a:p>
             <a:fld id="{366C7219-F141-4E29-8D5C-5E288BED1C06}" type="datetimeFigureOut">
               <a:rPr lang="pt-BR" smtClean="0"/>
-              <a:t>16/03/2019</a:t>
+              <a:t>17/04/2019</a:t>
             </a:fld>
             <a:endParaRPr lang="pt-BR"/>
           </a:p>
@@ -1408,7 +1408,7 @@
           <a:p>
             <a:fld id="{366C7219-F141-4E29-8D5C-5E288BED1C06}" type="datetimeFigureOut">
               <a:rPr lang="pt-BR" smtClean="0"/>
-              <a:t>16/03/2019</a:t>
+              <a:t>17/04/2019</a:t>
             </a:fld>
             <a:endParaRPr lang="pt-BR"/>
           </a:p>
@@ -1820,7 +1820,7 @@
           <a:p>
             <a:fld id="{366C7219-F141-4E29-8D5C-5E288BED1C06}" type="datetimeFigureOut">
               <a:rPr lang="pt-BR" smtClean="0"/>
-              <a:t>16/03/2019</a:t>
+              <a:t>17/04/2019</a:t>
             </a:fld>
             <a:endParaRPr lang="pt-BR"/>
           </a:p>
@@ -1961,7 +1961,7 @@
           <a:p>
             <a:fld id="{366C7219-F141-4E29-8D5C-5E288BED1C06}" type="datetimeFigureOut">
               <a:rPr lang="pt-BR" smtClean="0"/>
-              <a:t>16/03/2019</a:t>
+              <a:t>17/04/2019</a:t>
             </a:fld>
             <a:endParaRPr lang="pt-BR"/>
           </a:p>
@@ -2074,7 +2074,7 @@
           <a:p>
             <a:fld id="{366C7219-F141-4E29-8D5C-5E288BED1C06}" type="datetimeFigureOut">
               <a:rPr lang="pt-BR" smtClean="0"/>
-              <a:t>16/03/2019</a:t>
+              <a:t>17/04/2019</a:t>
             </a:fld>
             <a:endParaRPr lang="pt-BR"/>
           </a:p>
@@ -2385,7 +2385,7 @@
           <a:p>
             <a:fld id="{366C7219-F141-4E29-8D5C-5E288BED1C06}" type="datetimeFigureOut">
               <a:rPr lang="pt-BR" smtClean="0"/>
-              <a:t>16/03/2019</a:t>
+              <a:t>17/04/2019</a:t>
             </a:fld>
             <a:endParaRPr lang="pt-BR"/>
           </a:p>
@@ -2673,7 +2673,7 @@
           <a:p>
             <a:fld id="{366C7219-F141-4E29-8D5C-5E288BED1C06}" type="datetimeFigureOut">
               <a:rPr lang="pt-BR" smtClean="0"/>
-              <a:t>16/03/2019</a:t>
+              <a:t>17/04/2019</a:t>
             </a:fld>
             <a:endParaRPr lang="pt-BR"/>
           </a:p>
@@ -2914,7 +2914,7 @@
           <a:p>
             <a:fld id="{366C7219-F141-4E29-8D5C-5E288BED1C06}" type="datetimeFigureOut">
               <a:rPr lang="pt-BR" smtClean="0"/>
-              <a:t>16/03/2019</a:t>
+              <a:t>17/04/2019</a:t>
             </a:fld>
             <a:endParaRPr lang="pt-BR"/>
           </a:p>
@@ -4650,7 +4650,7 @@
         </p:spPr>
         <p:txBody>
           <a:bodyPr>
-            <a:normAutofit/>
+            <a:normAutofit lnSpcReduction="10000"/>
           </a:bodyPr>
           <a:lstStyle/>
           <a:p>
@@ -4662,6 +4662,12 @@
           <a:p>
             <a:r>
               <a:rPr lang="pt-BR" sz="1800" dirty="0"/>
+              <a:t>O sistema acionará irrigadores automáticos do local (caso existam) quando identificada umidade relativa do ar/solo muito baixa.</a:t>
+            </a:r>
+          </a:p>
+          <a:p>
+            <a:r>
+              <a:rPr lang="pt-BR" sz="1800" dirty="0"/>
               <a:t>Alertará os trabalhadores e moradores próximos de locais com o sistema instalado em caso de alastramento do incêndio.</a:t>
             </a:r>
           </a:p>
@@ -4670,6 +4676,9 @@
               <a:rPr lang="pt-BR" sz="1800" dirty="0"/>
               <a:t>Sistema terá banco de dados próprio, análise estatística própria, mas dará acesso aos dados para os órgãos governamentais.</a:t>
             </a:r>
+          </a:p>
+          <a:p>
+            <a:endParaRPr lang="pt-BR" sz="1800" dirty="0"/>
           </a:p>
         </p:txBody>
       </p:sp>

</xml_diff>